<commit_message>
committee presentation updated... again...
</commit_message>
<xml_diff>
--- a/docs/ועדת מעבר.pptx
+++ b/docs/ועדת מעבר.pptx
@@ -5,13 +5,14 @@
     <p:sldMasterId id="2147483672" r:id="rId1"/>
   </p:sldMasterIdLst>
   <p:notesMasterIdLst>
-    <p:notesMasterId r:id="rId6"/>
+    <p:notesMasterId r:id="rId7"/>
   </p:notesMasterIdLst>
   <p:sldIdLst>
     <p:sldId id="261" r:id="rId2"/>
-    <p:sldId id="273" r:id="rId3"/>
-    <p:sldId id="275" r:id="rId4"/>
-    <p:sldId id="276" r:id="rId5"/>
+    <p:sldId id="277" r:id="rId3"/>
+    <p:sldId id="273" r:id="rId4"/>
+    <p:sldId id="275" r:id="rId5"/>
+    <p:sldId id="276" r:id="rId6"/>
   </p:sldIdLst>
   <p:sldSz cx="9144000" cy="6858000" type="screen4x3"/>
   <p:notesSz cx="6858000" cy="9144000"/>
@@ -212,7 +213,7 @@
             <a:fld id="{416AAA16-F7F4-4BB7-BC2D-56E3A3EFD626}" type="datetimeFigureOut">
               <a:rPr lang="he-IL" smtClean="0"/>
               <a:pPr/>
-              <a:t>כ"ח/כסלו/תשע"ד</a:t>
+              <a:t>א'/טבת/תשע"ד</a:t>
             </a:fld>
             <a:endParaRPr lang="he-IL"/>
           </a:p>
@@ -665,7 +666,7 @@
             <a:fld id="{0309AE4F-9C54-4FEE-ACEC-1FFC3EC84708}" type="datetimeFigureOut">
               <a:rPr lang="he-IL" smtClean="0"/>
               <a:pPr/>
-              <a:t>כ"ח/כסלו/תשע"ד</a:t>
+              <a:t>א'/טבת/תשע"ד</a:t>
             </a:fld>
             <a:endParaRPr lang="he-IL"/>
           </a:p>
@@ -842,7 +843,7 @@
             <a:fld id="{0309AE4F-9C54-4FEE-ACEC-1FFC3EC84708}" type="datetimeFigureOut">
               <a:rPr lang="he-IL" smtClean="0"/>
               <a:pPr/>
-              <a:t>כ"ח/כסלו/תשע"ד</a:t>
+              <a:t>א'/טבת/תשע"ד</a:t>
             </a:fld>
             <a:endParaRPr lang="he-IL"/>
           </a:p>
@@ -1019,7 +1020,7 @@
             <a:fld id="{0309AE4F-9C54-4FEE-ACEC-1FFC3EC84708}" type="datetimeFigureOut">
               <a:rPr lang="he-IL" smtClean="0"/>
               <a:pPr/>
-              <a:t>כ"ח/כסלו/תשע"ד</a:t>
+              <a:t>א'/טבת/תשע"ד</a:t>
             </a:fld>
             <a:endParaRPr lang="he-IL"/>
           </a:p>
@@ -1186,7 +1187,7 @@
             <a:fld id="{0309AE4F-9C54-4FEE-ACEC-1FFC3EC84708}" type="datetimeFigureOut">
               <a:rPr lang="he-IL" smtClean="0"/>
               <a:pPr/>
-              <a:t>כ"ח/כסלו/תשע"ד</a:t>
+              <a:t>א'/טבת/תשע"ד</a:t>
             </a:fld>
             <a:endParaRPr lang="he-IL"/>
           </a:p>
@@ -1429,7 +1430,7 @@
             <a:fld id="{0309AE4F-9C54-4FEE-ACEC-1FFC3EC84708}" type="datetimeFigureOut">
               <a:rPr lang="he-IL" smtClean="0"/>
               <a:pPr/>
-              <a:t>כ"ח/כסלו/תשע"ד</a:t>
+              <a:t>א'/טבת/תשע"ד</a:t>
             </a:fld>
             <a:endParaRPr lang="he-IL"/>
           </a:p>
@@ -1714,7 +1715,7 @@
             <a:fld id="{0309AE4F-9C54-4FEE-ACEC-1FFC3EC84708}" type="datetimeFigureOut">
               <a:rPr lang="he-IL" smtClean="0"/>
               <a:pPr/>
-              <a:t>כ"ח/כסלו/תשע"ד</a:t>
+              <a:t>א'/טבת/תשע"ד</a:t>
             </a:fld>
             <a:endParaRPr lang="he-IL"/>
           </a:p>
@@ -2133,7 +2134,7 @@
             <a:fld id="{0309AE4F-9C54-4FEE-ACEC-1FFC3EC84708}" type="datetimeFigureOut">
               <a:rPr lang="he-IL" smtClean="0"/>
               <a:pPr/>
-              <a:t>כ"ח/כסלו/תשע"ד</a:t>
+              <a:t>א'/טבת/תשע"ד</a:t>
             </a:fld>
             <a:endParaRPr lang="he-IL"/>
           </a:p>
@@ -2248,7 +2249,7 @@
             <a:fld id="{0309AE4F-9C54-4FEE-ACEC-1FFC3EC84708}" type="datetimeFigureOut">
               <a:rPr lang="he-IL" smtClean="0"/>
               <a:pPr/>
-              <a:t>כ"ח/כסלו/תשע"ד</a:t>
+              <a:t>א'/טבת/תשע"ד</a:t>
             </a:fld>
             <a:endParaRPr lang="he-IL"/>
           </a:p>
@@ -2340,7 +2341,7 @@
             <a:fld id="{0309AE4F-9C54-4FEE-ACEC-1FFC3EC84708}" type="datetimeFigureOut">
               <a:rPr lang="he-IL" smtClean="0"/>
               <a:pPr/>
-              <a:t>כ"ח/כסלו/תשע"ד</a:t>
+              <a:t>א'/טבת/תשע"ד</a:t>
             </a:fld>
             <a:endParaRPr lang="he-IL"/>
           </a:p>
@@ -2614,7 +2615,7 @@
             <a:fld id="{0309AE4F-9C54-4FEE-ACEC-1FFC3EC84708}" type="datetimeFigureOut">
               <a:rPr lang="he-IL" smtClean="0"/>
               <a:pPr/>
-              <a:t>כ"ח/כסלו/תשע"ד</a:t>
+              <a:t>א'/טבת/תשע"ד</a:t>
             </a:fld>
             <a:endParaRPr lang="he-IL"/>
           </a:p>
@@ -2864,7 +2865,7 @@
             <a:fld id="{0309AE4F-9C54-4FEE-ACEC-1FFC3EC84708}" type="datetimeFigureOut">
               <a:rPr lang="he-IL" smtClean="0"/>
               <a:pPr/>
-              <a:t>כ"ח/כסלו/תשע"ד</a:t>
+              <a:t>א'/טבת/תשע"ד</a:t>
             </a:fld>
             <a:endParaRPr lang="he-IL"/>
           </a:p>
@@ -3743,7 +3744,7 @@
     </p:spTree>
     <p:extLst>
       <p:ext uri="{BB962C8B-B14F-4D97-AF65-F5344CB8AC3E}">
-        <p14:creationId xmlns:p14="http://schemas.microsoft.com/office/powerpoint/2010/main" val="371348189"/>
+        <p14:creationId xmlns:p14="http://schemas.microsoft.com/office/powerpoint/2010/main" val="124394730"/>
       </p:ext>
     </p:extLst>
   </p:cSld>
@@ -3826,7 +3827,7 @@
           <a:p>
             <a:r>
               <a:rPr lang="he-IL" dirty="0" smtClean="0"/>
-              <a:t>הצדקה אקדמית</a:t>
+              <a:t>תוכן הפרויקט</a:t>
             </a:r>
             <a:endParaRPr lang="he-IL" dirty="0"/>
           </a:p>
@@ -3845,7 +3846,7 @@
         <p:spPr/>
         <p:txBody>
           <a:bodyPr>
-            <a:normAutofit fontScale="92500" lnSpcReduction="10000"/>
+            <a:normAutofit/>
           </a:bodyPr>
           <a:lstStyle/>
           <a:p>
@@ -3854,23 +3855,23 @@
               <a:buChar char="q"/>
             </a:pPr>
             <a:r>
-              <a:rPr lang="he-IL" dirty="0" smtClean="0"/>
+              <a:rPr lang="he-IL" dirty="0"/>
               <a:t>לעומת </a:t>
             </a:r>
             <a:r>
-              <a:rPr lang="en-US" dirty="0" err="1" smtClean="0"/>
+              <a:rPr lang="en-US" dirty="0" err="1"/>
               <a:t>siri</a:t>
             </a:r>
             <a:r>
-              <a:rPr lang="he-IL" dirty="0" smtClean="0"/>
+              <a:rPr lang="he-IL" dirty="0"/>
               <a:t> או </a:t>
             </a:r>
             <a:r>
-              <a:rPr lang="en-US" dirty="0" smtClean="0"/>
+              <a:rPr lang="en-US" dirty="0"/>
               <a:t>google now</a:t>
             </a:r>
             <a:r>
-              <a:rPr lang="he-IL" dirty="0" smtClean="0"/>
+              <a:rPr lang="he-IL" dirty="0"/>
               <a:t> המערכת שלנו תינתן להתקנה על מחשב (בשלל מערכות הפעלה) </a:t>
             </a:r>
           </a:p>
@@ -3880,7 +3881,7 @@
               <a:buChar char="q"/>
             </a:pPr>
             <a:r>
-              <a:rPr lang="he-IL" dirty="0" smtClean="0"/>
+              <a:rPr lang="he-IL" dirty="0"/>
               <a:t>שלא כמו ביישומים קיימים, ניתן יהיה להוסיף ולהרחיב את הפקודות הקוליות של המערכת באופן עצמאי.</a:t>
             </a:r>
           </a:p>
@@ -3890,47 +3891,39 @@
               <a:buChar char="q"/>
             </a:pPr>
             <a:r>
-              <a:rPr lang="he-IL" dirty="0" smtClean="0"/>
-              <a:t>המערכת </a:t>
-            </a:r>
-            <a:r>
-              <a:rPr lang="he-IL" dirty="0" smtClean="0"/>
-              <a:t>תאפשר </a:t>
-            </a:r>
-            <a:r>
-              <a:rPr lang="he-IL" dirty="0" smtClean="0"/>
-              <a:t>פעולות על מערכת ההפעלה (לפתוח </a:t>
-            </a:r>
-            <a:r>
-              <a:rPr lang="en-US" dirty="0" smtClean="0"/>
+              <a:rPr lang="he-IL" dirty="0"/>
+              <a:t>המערכת תאפשר פעולות על מערכת ההפעלה (לפתוח </a:t>
+            </a:r>
+            <a:r>
+              <a:rPr lang="en-US" dirty="0"/>
               <a:t>Word</a:t>
             </a:r>
             <a:r>
-              <a:rPr lang="he-IL" dirty="0" smtClean="0"/>
+              <a:rPr lang="he-IL" dirty="0"/>
               <a:t>, ליצור ולמחוק קבצים וכד') וגם בתוך אתרים בדפדפן (למצוא תמונות של חבר ב</a:t>
             </a:r>
             <a:r>
-              <a:rPr lang="en-US" dirty="0" err="1" smtClean="0"/>
+              <a:rPr lang="en-US" dirty="0" err="1"/>
               <a:t>facebook</a:t>
             </a:r>
             <a:r>
-              <a:rPr lang="he-IL" dirty="0" smtClean="0"/>
+              <a:rPr lang="he-IL" dirty="0"/>
               <a:t>, לראות מיילים ב</a:t>
             </a:r>
             <a:r>
-              <a:rPr lang="en-US" dirty="0" smtClean="0"/>
+              <a:rPr lang="en-US" dirty="0"/>
               <a:t>Gmail</a:t>
             </a:r>
             <a:r>
-              <a:rPr lang="he-IL" dirty="0" smtClean="0"/>
+              <a:rPr lang="he-IL" dirty="0"/>
               <a:t>, להעלות קבצים ל</a:t>
             </a:r>
             <a:r>
-              <a:rPr lang="en-US" dirty="0" err="1" smtClean="0"/>
+              <a:rPr lang="en-US" dirty="0"/>
               <a:t>Dropbox</a:t>
             </a:r>
             <a:r>
-              <a:rPr lang="he-IL" dirty="0" smtClean="0"/>
+              <a:rPr lang="he-IL" dirty="0"/>
               <a:t> וכד')</a:t>
             </a:r>
           </a:p>
@@ -3939,26 +3932,14 @@
               <a:buFont typeface="Wingdings" pitchFamily="2" charset="2"/>
               <a:buChar char="q"/>
             </a:pPr>
-            <a:r>
-              <a:rPr lang="he-IL" dirty="0" smtClean="0"/>
-              <a:t>המערכת </a:t>
-            </a:r>
-            <a:r>
-              <a:rPr lang="he-IL" dirty="0" smtClean="0"/>
-              <a:t>תהיה </a:t>
-            </a:r>
-            <a:r>
-              <a:rPr lang="he-IL" dirty="0" smtClean="0"/>
-              <a:t>אינטואיטיבית ותאפשר חווית משתמש פשוטה ונעימה, ותכלול מערכות למידה לצורך "הבנת" המשתמש בזמן אמת.</a:t>
-            </a:r>
-            <a:endParaRPr lang="he-IL" dirty="0"/>
+            <a:endParaRPr lang="he-IL" dirty="0" smtClean="0"/>
           </a:p>
         </p:txBody>
       </p:sp>
     </p:spTree>
     <p:extLst>
       <p:ext uri="{BB962C8B-B14F-4D97-AF65-F5344CB8AC3E}">
-        <p14:creationId xmlns:p14="http://schemas.microsoft.com/office/powerpoint/2010/main" val="1949912456"/>
+        <p14:creationId xmlns:p14="http://schemas.microsoft.com/office/powerpoint/2010/main" val="371348189"/>
       </p:ext>
     </p:extLst>
   </p:cSld>
@@ -4041,7 +4022,7 @@
           <a:p>
             <a:r>
               <a:rPr lang="he-IL" dirty="0" smtClean="0"/>
-              <a:t>מהלך הפרויקט</a:t>
+              <a:t>הצדקה אקדמית</a:t>
             </a:r>
             <a:endParaRPr lang="he-IL" dirty="0"/>
           </a:p>
@@ -4070,7 +4051,19 @@
             </a:pPr>
             <a:r>
               <a:rPr lang="he-IL" dirty="0" smtClean="0"/>
-              <a:t>תשתית ראשונית לפעולות קוליות (בוצע)</a:t>
+              <a:t>המערכת מבוססת ענן וטכנולוגיות המתקדמות ביותר כיום (</a:t>
+            </a:r>
+            <a:r>
+              <a:rPr lang="en-US" dirty="0" err="1" smtClean="0"/>
+              <a:t>nodeJs</a:t>
+            </a:r>
+            <a:r>
+              <a:rPr lang="en-US" dirty="0" smtClean="0"/>
+              <a:t>, angular, responsive design, NLP…</a:t>
+            </a:r>
+            <a:r>
+              <a:rPr lang="he-IL" dirty="0" smtClean="0"/>
+              <a:t>)</a:t>
             </a:r>
           </a:p>
           <a:p>
@@ -4079,8 +4072,32 @@
               <a:buChar char="q"/>
             </a:pPr>
             <a:r>
-              <a:rPr lang="he-IL" dirty="0"/>
-              <a:t>אתר הסבר הורדה והדגמת שימוש (התחיל)</a:t>
+              <a:rPr lang="he-IL" dirty="0" smtClean="0"/>
+              <a:t>המערכת </a:t>
+            </a:r>
+            <a:r>
+              <a:rPr lang="he-IL" dirty="0" smtClean="0"/>
+              <a:t>תהיה אינטואיטיבית </a:t>
+            </a:r>
+            <a:r>
+              <a:rPr lang="he-IL" dirty="0" smtClean="0"/>
+              <a:t>ות</a:t>
+            </a:r>
+            <a:r>
+              <a:rPr lang="he-IL" dirty="0" smtClean="0"/>
+              <a:t>כיל</a:t>
+            </a:r>
+            <a:r>
+              <a:rPr lang="he-IL" dirty="0" smtClean="0"/>
+              <a:t> </a:t>
+            </a:r>
+            <a:r>
+              <a:rPr lang="he-IL" dirty="0" smtClean="0"/>
+              <a:t>חווית משתמש פשוטה </a:t>
+            </a:r>
+            <a:r>
+              <a:rPr lang="he-IL" dirty="0" smtClean="0"/>
+              <a:t>ונעימה.</a:t>
             </a:r>
           </a:p>
           <a:p>
@@ -4090,9 +4107,195 @@
             </a:pPr>
             <a:r>
               <a:rPr lang="he-IL" dirty="0" smtClean="0"/>
-              <a:t>הטמעת יכולות מערכת למידה</a:t>
+              <a:t>המערכת תכלול אלגוריתמי </a:t>
+            </a:r>
+            <a:r>
+              <a:rPr lang="he-IL" dirty="0" smtClean="0"/>
+              <a:t>למידה </a:t>
+            </a:r>
+            <a:r>
+              <a:rPr lang="he-IL" dirty="0" smtClean="0"/>
+              <a:t>ואלגוריתמי שפה טבעית לצורך </a:t>
+            </a:r>
+            <a:r>
+              <a:rPr lang="he-IL" dirty="0" smtClean="0"/>
+              <a:t>"הבנת" המשתמש בזמן אמת</a:t>
+            </a:r>
+            <a:r>
+              <a:rPr lang="he-IL" dirty="0" smtClean="0"/>
+              <a:t>.</a:t>
             </a:r>
             <a:endParaRPr lang="en-US" dirty="0" smtClean="0"/>
+          </a:p>
+        </p:txBody>
+      </p:sp>
+    </p:spTree>
+    <p:extLst>
+      <p:ext uri="{BB962C8B-B14F-4D97-AF65-F5344CB8AC3E}">
+        <p14:creationId xmlns:p14="http://schemas.microsoft.com/office/powerpoint/2010/main" val="1949912456"/>
+      </p:ext>
+    </p:extLst>
+  </p:cSld>
+  <p:clrMapOvr>
+    <a:masterClrMapping/>
+  </p:clrMapOvr>
+  <p:timing>
+    <p:tnLst>
+      <p:par>
+        <p:cTn id="1" dur="indefinite" restart="never" nodeType="tmRoot"/>
+      </p:par>
+    </p:tnLst>
+  </p:timing>
+</p:sld>
+</file>
+
+<file path=ppt/slides/slide5.xml><?xml version="1.0" encoding="utf-8"?>
+<p:sld xmlns:a="http://schemas.openxmlformats.org/drawingml/2006/main" xmlns:r="http://schemas.openxmlformats.org/officeDocument/2006/relationships" xmlns:p="http://schemas.openxmlformats.org/presentationml/2006/main">
+  <p:cSld>
+    <p:spTree>
+      <p:nvGrpSpPr>
+        <p:cNvPr id="1" name=""/>
+        <p:cNvGrpSpPr/>
+        <p:nvPr/>
+      </p:nvGrpSpPr>
+      <p:grpSpPr>
+        <a:xfrm>
+          <a:off x="0" y="0"/>
+          <a:ext cx="0" cy="0"/>
+          <a:chOff x="0" y="0"/>
+          <a:chExt cx="0" cy="0"/>
+        </a:xfrm>
+      </p:grpSpPr>
+      <p:pic>
+        <p:nvPicPr>
+          <p:cNvPr id="4" name="Picture 4"/>
+          <p:cNvPicPr>
+            <a:picLocks noChangeAspect="1" noChangeArrowheads="1"/>
+          </p:cNvPicPr>
+          <p:nvPr/>
+        </p:nvPicPr>
+        <p:blipFill>
+          <a:blip r:embed="rId2" cstate="print"/>
+          <a:srcRect/>
+          <a:stretch>
+            <a:fillRect/>
+          </a:stretch>
+        </p:blipFill>
+        <p:spPr bwMode="auto">
+          <a:xfrm>
+            <a:off x="1" y="0"/>
+            <a:ext cx="9143999" cy="6873099"/>
+          </a:xfrm>
+          <a:prstGeom prst="rect">
+            <a:avLst/>
+          </a:prstGeom>
+          <a:noFill/>
+          <a:ln w="12700" cap="rnd">
+            <a:noFill/>
+            <a:round/>
+            <a:headEnd/>
+            <a:tailEnd/>
+          </a:ln>
+        </p:spPr>
+      </p:pic>
+      <p:sp>
+        <p:nvSpPr>
+          <p:cNvPr id="2" name="כותרת 1"/>
+          <p:cNvSpPr>
+            <a:spLocks noGrp="1"/>
+          </p:cNvSpPr>
+          <p:nvPr>
+            <p:ph type="title"/>
+          </p:nvPr>
+        </p:nvSpPr>
+        <p:spPr/>
+        <p:txBody>
+          <a:bodyPr/>
+          <a:lstStyle/>
+          <a:p>
+            <a:r>
+              <a:rPr lang="he-IL" dirty="0" smtClean="0"/>
+              <a:t>מהלך הפרויקט</a:t>
+            </a:r>
+            <a:endParaRPr lang="he-IL" dirty="0"/>
+          </a:p>
+        </p:txBody>
+      </p:sp>
+      <p:sp>
+        <p:nvSpPr>
+          <p:cNvPr id="3" name="מציין מיקום תוכן 2"/>
+          <p:cNvSpPr>
+            <a:spLocks noGrp="1"/>
+          </p:cNvSpPr>
+          <p:nvPr>
+            <p:ph idx="1"/>
+          </p:nvPr>
+        </p:nvSpPr>
+        <p:spPr/>
+        <p:txBody>
+          <a:bodyPr>
+            <a:normAutofit fontScale="92500" lnSpcReduction="20000"/>
+          </a:bodyPr>
+          <a:lstStyle/>
+          <a:p>
+            <a:pPr lvl="1">
+              <a:buFont typeface="Wingdings" panose="05000000000000000000" pitchFamily="2" charset="2"/>
+              <a:buChar char="ü"/>
+            </a:pPr>
+            <a:r>
+              <a:rPr lang="he-IL" dirty="0" smtClean="0"/>
+              <a:t>הצעת פרויקט (בוצע)</a:t>
+            </a:r>
+          </a:p>
+          <a:p>
+            <a:pPr lvl="1">
+              <a:buFont typeface="Wingdings" panose="05000000000000000000" pitchFamily="2" charset="2"/>
+              <a:buChar char="ü"/>
+            </a:pPr>
+            <a:r>
+              <a:rPr lang="he-IL" dirty="0" smtClean="0"/>
+              <a:t>מצגת לועדת מעבר (בוצע)</a:t>
+            </a:r>
+          </a:p>
+          <a:p>
+            <a:pPr lvl="1">
+              <a:buFont typeface="Wingdings" panose="05000000000000000000" pitchFamily="2" charset="2"/>
+              <a:buChar char="ü"/>
+            </a:pPr>
+            <a:r>
+              <a:rPr lang="he-IL" dirty="0" smtClean="0"/>
+              <a:t>איפיון ראשוני (בוצע)</a:t>
+            </a:r>
+          </a:p>
+          <a:p>
+            <a:pPr lvl="1">
+              <a:buFont typeface="Wingdings" panose="05000000000000000000" pitchFamily="2" charset="2"/>
+              <a:buChar char="ü"/>
+            </a:pPr>
+            <a:r>
+              <a:rPr lang="he-IL" dirty="0" smtClean="0"/>
+              <a:t>תשתית </a:t>
+            </a:r>
+            <a:r>
+              <a:rPr lang="he-IL" dirty="0" smtClean="0"/>
+              <a:t>ראשונית לפעולות </a:t>
+            </a:r>
+            <a:r>
+              <a:rPr lang="he-IL" dirty="0" smtClean="0"/>
+              <a:t>קוליות - </a:t>
+            </a:r>
+            <a:r>
+              <a:rPr lang="en-US" dirty="0" smtClean="0"/>
+              <a:t>POC</a:t>
+            </a:r>
+            <a:r>
+              <a:rPr lang="he-IL" dirty="0" smtClean="0"/>
+              <a:t> </a:t>
+            </a:r>
+            <a:r>
+              <a:rPr lang="he-IL" dirty="0" smtClean="0"/>
+              <a:t>(בוצע)</a:t>
+            </a:r>
           </a:p>
           <a:p>
             <a:pPr lvl="1">
@@ -4100,16 +4303,8 @@
               <a:buChar char="q"/>
             </a:pPr>
             <a:r>
-              <a:rPr lang="he-IL" dirty="0" smtClean="0"/>
-              <a:t>הרחבת התשתית ושימוש ב</a:t>
-            </a:r>
-            <a:r>
-              <a:rPr lang="en-US" dirty="0" smtClean="0"/>
-              <a:t>DB</a:t>
-            </a:r>
-            <a:r>
-              <a:rPr lang="he-IL" dirty="0" smtClean="0"/>
-              <a:t> מרכזי</a:t>
+              <a:rPr lang="he-IL" dirty="0"/>
+              <a:t>אתר הסבר הורדה והדגמת שימוש (התחיל)</a:t>
             </a:r>
           </a:p>
           <a:p>
@@ -4119,8 +4314,9 @@
             </a:pPr>
             <a:r>
               <a:rPr lang="he-IL" dirty="0" smtClean="0"/>
-              <a:t>פיתוח פעולות קוליות בסיסיות</a:t>
-            </a:r>
+              <a:t>הטמעת יכולות מערכת למידה</a:t>
+            </a:r>
+            <a:endParaRPr lang="en-US" dirty="0" smtClean="0"/>
           </a:p>
           <a:p>
             <a:pPr lvl="1">
@@ -4129,8 +4325,71 @@
             </a:pPr>
             <a:r>
               <a:rPr lang="he-IL" dirty="0" smtClean="0"/>
-              <a:t>חנות פעולות קוליות</a:t>
-            </a:r>
+              <a:t>הרחבת התשתית ושימוש ב</a:t>
+            </a:r>
+            <a:r>
+              <a:rPr lang="en-US" dirty="0" smtClean="0"/>
+              <a:t>DB</a:t>
+            </a:r>
+            <a:r>
+              <a:rPr lang="he-IL" dirty="0" smtClean="0"/>
+              <a:t> מרכזי</a:t>
+            </a:r>
+          </a:p>
+          <a:p>
+            <a:pPr lvl="1">
+              <a:buFont typeface="Wingdings" pitchFamily="2" charset="2"/>
+              <a:buChar char="q"/>
+            </a:pPr>
+            <a:r>
+              <a:rPr lang="he-IL" dirty="0" smtClean="0"/>
+              <a:t>פיתוח פעולות קוליות </a:t>
+            </a:r>
+            <a:r>
+              <a:rPr lang="he-IL" dirty="0" smtClean="0"/>
+              <a:t>בסיסיות</a:t>
+            </a:r>
+          </a:p>
+          <a:p>
+            <a:pPr lvl="1">
+              <a:buFont typeface="Wingdings" pitchFamily="2" charset="2"/>
+              <a:buChar char="q"/>
+            </a:pPr>
+            <a:r>
+              <a:rPr lang="he-IL" dirty="0" smtClean="0"/>
+              <a:t>מסמך תוכנית עסקית</a:t>
+            </a:r>
+            <a:endParaRPr lang="he-IL" dirty="0" smtClean="0"/>
+          </a:p>
+          <a:p>
+            <a:pPr lvl="1">
+              <a:buFont typeface="Wingdings" pitchFamily="2" charset="2"/>
+              <a:buChar char="q"/>
+            </a:pPr>
+            <a:r>
+              <a:rPr lang="he-IL" dirty="0" smtClean="0"/>
+              <a:t>חנות פעולות </a:t>
+            </a:r>
+            <a:r>
+              <a:rPr lang="he-IL" dirty="0" smtClean="0"/>
+              <a:t>קוליות</a:t>
+            </a:r>
+          </a:p>
+          <a:p>
+            <a:pPr marL="457200" lvl="1" indent="0">
+              <a:buNone/>
+            </a:pPr>
+            <a:endParaRPr lang="he-IL" sz="1900" dirty="0" smtClean="0"/>
+          </a:p>
+          <a:p>
+            <a:pPr marL="457200" lvl="1" indent="0">
+              <a:buNone/>
+            </a:pPr>
+            <a:r>
+              <a:rPr lang="he-IL" sz="1900" dirty="0" smtClean="0"/>
+              <a:t>* חלק מאבני הדרך ניתנים למימוש במקביל</a:t>
+            </a:r>
+            <a:endParaRPr lang="he-IL" sz="1900" dirty="0" smtClean="0"/>
           </a:p>
         </p:txBody>
       </p:sp>

</xml_diff>